<commit_message>
Update Group 2 _TNC MCU Project .pptx
</commit_message>
<xml_diff>
--- a/Group 2 _TNC MCU Project .pptx
+++ b/Group 2 _TNC MCU Project .pptx
@@ -118,6 +118,11 @@
       </a:defRPr>
     </a:lvl9pPr>
   </p:defaultTextStyle>
+  <p:extLst>
+    <p:ext uri="{EFAFB233-063F-42B5-8137-9DF3F51BA10A}">
+      <p15:sldGuideLst xmlns:p15="http://schemas.microsoft.com/office/powerpoint/2012/main"/>
+    </p:ext>
+  </p:extLst>
 </p:presentation>
 </file>
 
@@ -268,7 +273,7 @@
           <a:p>
             <a:fld id="{12B3CF37-ABD8-43A8-A940-E787B28D1AE5}" type="datetimeFigureOut">
               <a:rPr lang="en-US" smtClean="0"/>
-              <a:t>2/11/2020</a:t>
+              <a:t>2/12/2020</a:t>
             </a:fld>
             <a:endParaRPr lang="en-US"/>
           </a:p>
@@ -466,7 +471,7 @@
           <a:p>
             <a:fld id="{12B3CF37-ABD8-43A8-A940-E787B28D1AE5}" type="datetimeFigureOut">
               <a:rPr lang="en-US" smtClean="0"/>
-              <a:t>2/11/2020</a:t>
+              <a:t>2/12/2020</a:t>
             </a:fld>
             <a:endParaRPr lang="en-US"/>
           </a:p>
@@ -674,7 +679,7 @@
           <a:p>
             <a:fld id="{12B3CF37-ABD8-43A8-A940-E787B28D1AE5}" type="datetimeFigureOut">
               <a:rPr lang="en-US" smtClean="0"/>
-              <a:t>2/11/2020</a:t>
+              <a:t>2/12/2020</a:t>
             </a:fld>
             <a:endParaRPr lang="en-US"/>
           </a:p>
@@ -872,7 +877,7 @@
           <a:p>
             <a:fld id="{12B3CF37-ABD8-43A8-A940-E787B28D1AE5}" type="datetimeFigureOut">
               <a:rPr lang="en-US" smtClean="0"/>
-              <a:t>2/11/2020</a:t>
+              <a:t>2/12/2020</a:t>
             </a:fld>
             <a:endParaRPr lang="en-US"/>
           </a:p>
@@ -1147,7 +1152,7 @@
           <a:p>
             <a:fld id="{12B3CF37-ABD8-43A8-A940-E787B28D1AE5}" type="datetimeFigureOut">
               <a:rPr lang="en-US" smtClean="0"/>
-              <a:t>2/11/2020</a:t>
+              <a:t>2/12/2020</a:t>
             </a:fld>
             <a:endParaRPr lang="en-US"/>
           </a:p>
@@ -1412,7 +1417,7 @@
           <a:p>
             <a:fld id="{12B3CF37-ABD8-43A8-A940-E787B28D1AE5}" type="datetimeFigureOut">
               <a:rPr lang="en-US" smtClean="0"/>
-              <a:t>2/11/2020</a:t>
+              <a:t>2/12/2020</a:t>
             </a:fld>
             <a:endParaRPr lang="en-US"/>
           </a:p>
@@ -1824,7 +1829,7 @@
           <a:p>
             <a:fld id="{12B3CF37-ABD8-43A8-A940-E787B28D1AE5}" type="datetimeFigureOut">
               <a:rPr lang="en-US" smtClean="0"/>
-              <a:t>2/11/2020</a:t>
+              <a:t>2/12/2020</a:t>
             </a:fld>
             <a:endParaRPr lang="en-US"/>
           </a:p>
@@ -1965,7 +1970,7 @@
           <a:p>
             <a:fld id="{12B3CF37-ABD8-43A8-A940-E787B28D1AE5}" type="datetimeFigureOut">
               <a:rPr lang="en-US" smtClean="0"/>
-              <a:t>2/11/2020</a:t>
+              <a:t>2/12/2020</a:t>
             </a:fld>
             <a:endParaRPr lang="en-US"/>
           </a:p>
@@ -2078,7 +2083,7 @@
           <a:p>
             <a:fld id="{12B3CF37-ABD8-43A8-A940-E787B28D1AE5}" type="datetimeFigureOut">
               <a:rPr lang="en-US" smtClean="0"/>
-              <a:t>2/11/2020</a:t>
+              <a:t>2/12/2020</a:t>
             </a:fld>
             <a:endParaRPr lang="en-US"/>
           </a:p>
@@ -2389,7 +2394,7 @@
           <a:p>
             <a:fld id="{12B3CF37-ABD8-43A8-A940-E787B28D1AE5}" type="datetimeFigureOut">
               <a:rPr lang="en-US" smtClean="0"/>
-              <a:t>2/11/2020</a:t>
+              <a:t>2/12/2020</a:t>
             </a:fld>
             <a:endParaRPr lang="en-US"/>
           </a:p>
@@ -2677,7 +2682,7 @@
           <a:p>
             <a:fld id="{12B3CF37-ABD8-43A8-A940-E787B28D1AE5}" type="datetimeFigureOut">
               <a:rPr lang="en-US" smtClean="0"/>
-              <a:t>2/11/2020</a:t>
+              <a:t>2/12/2020</a:t>
             </a:fld>
             <a:endParaRPr lang="en-US"/>
           </a:p>
@@ -2918,7 +2923,7 @@
           <a:p>
             <a:fld id="{12B3CF37-ABD8-43A8-A940-E787B28D1AE5}" type="datetimeFigureOut">
               <a:rPr lang="en-US" smtClean="0"/>
-              <a:t>2/11/2020</a:t>
+              <a:t>2/12/2020</a:t>
             </a:fld>
             <a:endParaRPr lang="en-US"/>
           </a:p>
@@ -5328,8 +5333,13 @@
             </a:r>
             <a:r>
               <a:rPr lang="en-US" dirty="0"/>
-              <a:t> – 0111110</a:t>
-            </a:r>
+              <a:t> </a:t>
+            </a:r>
+            <a:r>
+              <a:rPr lang="en-US"/>
+              <a:t>– 01111110</a:t>
+            </a:r>
+            <a:endParaRPr lang="en-US" dirty="0"/>
           </a:p>
           <a:p>
             <a:pPr marL="0" indent="0">

</xml_diff>